<commit_message>
update of slurm files for Moco dann methods
</commit_message>
<xml_diff>
--- a/reports_and_presentation/Summer_Project_Presentation_ver3.0.pptx
+++ b/reports_and_presentation/Summer_Project_Presentation_ver3.0.pptx
@@ -242,7 +242,7 @@
           <a:p>
             <a:fld id="{3FFB73A2-7F28-BF4D-B579-BB0713717021}" type="datetimeFigureOut">
               <a:rPr kumimoji="1" lang="zh-CN" altLang="en-US" smtClean="0"/>
-              <a:t>2022/2/25</a:t>
+              <a:t>2022/2/27</a:t>
             </a:fld>
             <a:endParaRPr kumimoji="1" lang="zh-CN" altLang="en-US"/>
           </a:p>
@@ -984,7 +984,7 @@
           <a:p>
             <a:r>
               <a:rPr kumimoji="1" lang="en-US" altLang="zh-CN" dirty="0"/>
-              <a:t>It typically consists of three components; we can think about these as three networks. </a:t>
+              <a:t>It typically consists of three components;</a:t>
             </a:r>
           </a:p>
           <a:p>
@@ -1100,6 +1100,12 @@
               <a:t>Label predictor produces the predicted class label of input x.</a:t>
             </a:r>
           </a:p>
+          <a:p>
+            <a:r>
+              <a:rPr kumimoji="1" lang="en-US" altLang="zh-CN" dirty="0"/>
+              <a:t>The weight of three components of the DANN will be updated at the same time.</a:t>
+            </a:r>
+          </a:p>
         </p:txBody>
       </p:sp>
       <p:sp>
@@ -1184,7 +1190,7 @@
           <a:p>
             <a:r>
               <a:rPr kumimoji="1" lang="en-US" altLang="zh-CN" dirty="0"/>
-              <a:t>Briefly, the notion of the semi-supervised learning are very similar to formulation of UDA, but we typically assume that the labeled samples and unlabeled samples come from the the same distribution.</a:t>
+              <a:t>The notion of the semi-supervised learning are very similar to formulation of UDA, but we typically assume that the labeled samples and unlabeled samples come from the the same distribution.</a:t>
             </a:r>
           </a:p>
         </p:txBody>
@@ -1487,7 +1493,7 @@
           <a:p>
             <a:r>
               <a:rPr kumimoji="1" lang="en-US" altLang="zh-CN" dirty="0"/>
-              <a:t>The two datasets are ImageNet and Office31 </a:t>
+              <a:t>In addition, the two datasets are ImageNet and Office31 </a:t>
             </a:r>
           </a:p>
           <a:p>
@@ -1593,7 +1599,16 @@
           <a:p>
             <a:r>
               <a:rPr kumimoji="1" lang="en-US" altLang="zh-CN" dirty="0"/>
-              <a:t>In the steps of our experiments , </a:t>
+              <a:t>In the steps of our experiments,</a:t>
+            </a:r>
+          </a:p>
+          <a:p>
+            <a:endParaRPr kumimoji="1" lang="en-US" altLang="zh-CN" dirty="0"/>
+          </a:p>
+          <a:p>
+            <a:r>
+              <a:rPr kumimoji="1" lang="en-US" altLang="zh-CN" dirty="0"/>
+              <a:t>We have three datasets, </a:t>
             </a:r>
           </a:p>
           <a:p>
@@ -1618,7 +1633,7 @@
           <a:p>
             <a:r>
               <a:rPr kumimoji="1" lang="en-US" altLang="zh-CN" dirty="0"/>
-              <a:t>In addition, We also use the original ImageNet as a control group </a:t>
+              <a:t>In addition, We also use the original ImageNet as a control group to compare the results of the models. </a:t>
             </a:r>
           </a:p>
           <a:p>
@@ -1987,15 +2002,7 @@
           <a:p>
             <a:r>
               <a:rPr kumimoji="1" lang="en-US" altLang="zh-CN" dirty="0"/>
-              <a:t>Nonetheless, our results are still behind that of the original paper which achieved the top-1 </a:t>
-            </a:r>
-            <a:r>
-              <a:rPr kumimoji="1" lang="en-US" altLang="zh-CN" dirty="0" err="1"/>
-              <a:t>ofabout</a:t>
-            </a:r>
-            <a:r>
-              <a:rPr kumimoji="1" lang="en-US" altLang="zh-CN" dirty="0"/>
-              <a:t> 60 \%but considering of non-identical dataset and the coding platform used in implementing this architecture and training the model, we believe that there is still a room of improvement of classification accuracy after the hyperparameter optimization. </a:t>
+              <a:t>Nonetheless, our results are still behind that of the original paper which achieved the top-1 of about 60 \%but considering of non-identical dataset and the coding platform used in implementing this architecture and training the model, we believe that there is still a room of improvement of classification accuracy after the hyperparameter optimization. </a:t>
             </a:r>
           </a:p>
           <a:p>
@@ -2101,24 +2108,16 @@
           <a:p>
             <a:r>
               <a:rPr kumimoji="1" lang="en-US" altLang="zh-CN" dirty="0"/>
-              <a:t>Nonetheless, our results are still behind that of the original paper which achieved the top-1 </a:t>
-            </a:r>
-            <a:r>
-              <a:rPr kumimoji="1" lang="en-US" altLang="zh-CN" dirty="0" err="1"/>
-              <a:t>ofabout</a:t>
-            </a:r>
+              <a:t>Nonetheless, our results are still behind that of the original paper which achieved the top-1 of about 60 \%but considering of non-identical dataset and the coding platform used in implementing this architecture and training the model, we believe that there is still a room of improvement of classification accuracy after the hyperparameter optimization. </a:t>
+            </a:r>
+          </a:p>
+          <a:p>
+            <a:endParaRPr kumimoji="1" lang="en-US" altLang="zh-CN" dirty="0"/>
+          </a:p>
+          <a:p>
             <a:r>
               <a:rPr kumimoji="1" lang="en-US" altLang="zh-CN" dirty="0"/>
-              <a:t> 60 \%but considering of non-identical dataset and the coding platform used in implementing this architecture and training the model, we believe that there is still a room of improvement of classification accuracy after the hyperparameter optimization. </a:t>
-            </a:r>
-          </a:p>
-          <a:p>
-            <a:endParaRPr kumimoji="1" lang="en-US" altLang="zh-CN" dirty="0"/>
-          </a:p>
-          <a:p>
-            <a:r>
-              <a:rPr kumimoji="1" lang="en-US" altLang="zh-CN" dirty="0"/>
-              <a:t>The validation accuracy on models with 1000 classes also does not exhibit inferior performance over the models (Random and Masked Datasets) with fewer classes, and it takes more training iterations to reach top-1 accuracy of 55 %.</a:t>
+              <a:t>The validation accuracy on models with 1000 classes also does not exhibit/show inferior performance over the models (Random and Masked Datasets) with fewer classes, and it takes more training iterations to reach top-1 accuracy of 55 %.</a:t>
             </a:r>
             <a:endParaRPr kumimoji="1" lang="zh-CN" altLang="en-US" dirty="0"/>
           </a:p>
@@ -2209,7 +2208,7 @@
           <a:p>
             <a:r>
               <a:rPr kumimoji="1" lang="en-US" altLang="zh-CN" dirty="0"/>
-              <a:t>The results of the pretrained models.</a:t>
+              <a:t>The results of the pretrained models in table form .</a:t>
             </a:r>
             <a:endParaRPr kumimoji="1" lang="zh-CN" altLang="en-US" dirty="0"/>
           </a:p>
@@ -2297,7 +2296,7 @@
           <a:p>
             <a:r>
               <a:rPr kumimoji="1" lang="en-US" altLang="zh-CN" dirty="0"/>
-              <a:t>% From the table above, we observe in general that using DANN and source-only methods, the domain adaptation tasks perform better on the pretrained model trained on the random dataset. The average increase in domain transfer accuracy with the respect to the choice of dataset of pretrained models is more obvious to DANN methods, up to 1.36 \%. Similarly, the Pseudo-label models pretrained on "Random" Dataset have the higher accuracy than that of the models pretrained on "Masked" dataset.</a:t>
+              <a:t>% From the table above(Domain Adaptation methods), we observe in general that using DANN and source-only methods, the domain adaptation tasks perform better on the pretrained model trained on the random dataset. The average increase in domain transfer accuracy with the respect to the choice of dataset of pretrained models is more obvious to DANN methods, up to 1.36 \%. Similarly, the Pseudo-label models pretrained on "Random" Dataset have the higher accuracy than that of the models pretrained on "Masked" dataset.</a:t>
             </a:r>
           </a:p>
           <a:p>
@@ -2315,7 +2314,7 @@
           <a:p>
             <a:r>
               <a:rPr kumimoji="1" lang="en-US" altLang="zh-CN" dirty="0"/>
-              <a:t>% We suspect the results obtained in first Table are affected by the certain level of randomness, and during the phase of fine-tuning, it is possible for some models to learn actual features quicker in the domain adaptation tasks, even though they are slightly different in initialization weights from pretrained model or even have a slight advantage of pretrained weights over others.</a:t>
+              <a:t>% We think the results obtained in first Table are affected by the certain level of randomness, and during the phase of fine-tuning, it is possible for some models to learn actual features quicker in the domain adaptation tasks, even though they are slightly different in initialization weights from pretrained model or even have a slight advantage of pretrained weights over others.</a:t>
             </a:r>
           </a:p>
           <a:p>
@@ -2324,7 +2323,7 @@
           <a:p>
             <a:r>
               <a:rPr kumimoji="1" lang="en-US" altLang="zh-CN" dirty="0"/>
-              <a:t> To avoid the weights being updated too much in our experiment when evaluating,  we examine through the domain  adaptation tasks result at the first epoch of fine-tuning training. </a:t>
+              <a:t> To avoid the weights being updated too much in our experiment when evaluating, we examine through the domain  adaptation tasks result at the first epoch of fine-tuning training. </a:t>
             </a:r>
           </a:p>
           <a:p>
@@ -2414,7 +2413,7 @@
           <a:p>
             <a:r>
               <a:rPr kumimoji="1" lang="en-US" altLang="zh-CN" dirty="0"/>
-              <a:t>% From the table above, we observe in general that using DANN and source-only methods, the domain adaptation tasks perform better on the pretrained model trained on the random dataset. The average increase in domain transfer accuracy with the respect to the choice of dataset of pretrained models is more obvious to DANN methods, up to 1.36 \%. Similarly, the Pseudo-label models pretrained on "Random" Dataset have the higher accuracy than that of the models pretrained on "Masked" dataset.</a:t>
+              <a:t>% From the table above(Domain Adaptation methods), we observe in general that using DANN and source-only methods, the domain adaptation tasks perform better on the pretrained model trained on the random dataset. The average increase in domain transfer accuracy with the respect to the choice of dataset of pretrained models is more obvious to DANN methods, up to 1.36 \%. Similarly, the Pseudo-label models pretrained on "Random" Dataset have the higher accuracy than that of the models pretrained on "Masked" dataset.</a:t>
             </a:r>
           </a:p>
           <a:p>
@@ -2432,7 +2431,7 @@
           <a:p>
             <a:r>
               <a:rPr kumimoji="1" lang="en-US" altLang="zh-CN" dirty="0"/>
-              <a:t>% We suspect the results obtained in first Table are affected by the certain level of randomness, and during the phase of fine-tuning, it is possible for some models to learn actual features quicker in the domain adaptation tasks, even though they are slightly different in initialization weights from pretrained model or even have a slight advantage of pretrained weights over others.</a:t>
+              <a:t>% We think the results obtained in first Table are affected by the certain level of randomness, and during the phase of fine-tuning, it is possible for some models to learn actual features quicker in the domain adaptation tasks, even though they are slightly different in initialization weights from pretrained model or even have a slight advantage of pretrained weights over others.</a:t>
             </a:r>
           </a:p>
           <a:p>
@@ -2441,23 +2440,11 @@
           <a:p>
             <a:r>
               <a:rPr kumimoji="1" lang="en-US" altLang="zh-CN" dirty="0"/>
-              <a:t> To avoid the weights being updated too much in our experiment when evaluating,  we examine through the domain  adaptation tasks result at the first epoch of fine-tuning training. </a:t>
-            </a:r>
-          </a:p>
-          <a:p>
-            <a:r>
-              <a:rPr kumimoji="1" lang="en-US" altLang="zh-CN" dirty="0"/>
-              <a:t> </a:t>
+              <a:t> To avoid the weights being updated too much in our experiment when evaluating, we examine through the domain  adaptation tasks result at the first epoch of fine-tuning training. </a:t>
             </a:r>
           </a:p>
           <a:p>
             <a:endParaRPr kumimoji="1" lang="en-US" altLang="zh-CN" dirty="0"/>
-          </a:p>
-          <a:p>
-            <a:r>
-              <a:rPr kumimoji="1" lang="en-US" altLang="zh-CN" dirty="0"/>
-              <a:t>Despite our efforts, we still observe the alternating changing patterns of mean accuracy on some six domain adaptation tasks. It seems that masking some classes in the pretrained model's dataset does not prevent the learning of relevant features in the pretrained dataset associated with UDA benchmark dataset Office31.</a:t>
-            </a:r>
           </a:p>
         </p:txBody>
       </p:sp>
@@ -2686,7 +2673,7 @@
           <a:p>
             <a:r>
               <a:rPr kumimoji="1" lang="en-US" altLang="zh-CN" dirty="0"/>
-              <a:t>2. working in improving  our methods of choosing the masked classes in the experiment </a:t>
+              <a:t>2. working on improving  our methods of choosing the masked classes in the experiment </a:t>
             </a:r>
           </a:p>
           <a:p>
@@ -2876,7 +2863,7 @@
           <a:p>
             <a:r>
               <a:rPr kumimoji="1" lang="en-US" altLang="zh-CN" dirty="0"/>
-              <a:t>% Then read some Literature reading, design the experiment and make sure the model can be implemented successfully</a:t>
+              <a:t>% Then read some Literature, design the experiment and make sure the model can be implemented successfully</a:t>
             </a:r>
           </a:p>
           <a:p>
@@ -3106,7 +3093,7 @@
           <a:p>
             <a:r>
               <a:rPr kumimoji="1" lang="en-US" altLang="zh-CN" dirty="0"/>
-              <a:t>And to be more specific,  we could have the unsupervised domain adaptation as well where we try to learn a model from the source domains with label data to target domain with unlabeled data.</a:t>
+              <a:t>We could have the unsupervised domain adaptation as well where we try to learn a model from the source domains with label data to target domain with unlabeled data.</a:t>
             </a:r>
             <a:endParaRPr kumimoji="1" lang="zh-CN" altLang="en-US" dirty="0"/>
           </a:p>
@@ -3456,21 +3443,7 @@
                 <a:latin typeface="Arial"/>
                 <a:cs typeface="Arial"/>
               </a:rPr>
-              <a:t>However, the paper did not </a:t>
-            </a:r>
-            <a:r>
-              <a:rPr lang="en-US" altLang="zh-CN" sz="1200" spc="-45" dirty="0" err="1">
-                <a:latin typeface="Arial"/>
-                <a:cs typeface="Arial"/>
-              </a:rPr>
-              <a:t>dicuss</a:t>
-            </a:r>
-            <a:r>
-              <a:rPr lang="en-US" altLang="zh-CN" sz="1200" spc="-45" dirty="0">
-                <a:latin typeface="Arial"/>
-                <a:cs typeface="Arial"/>
-              </a:rPr>
-              <a:t> </a:t>
+              <a:t>However, the paper did not discuss </a:t>
             </a:r>
             <a:r>
               <a:rPr lang="en-US" altLang="zh-CN" sz="1200" kern="1200" dirty="0">
@@ -3533,7 +3506,7 @@
                 <a:ea typeface="+mn-ea"/>
                 <a:cs typeface="+mn-cs"/>
               </a:rPr>
-              <a:t>Another research manages to show that Semi-supervised learning methods outperform some existing UDA methods on UDA benchmark. But one thing to note here is that in this paper, the SSL methods and UDA methods employed the pretrained models on ImageNet dataset. We can not be 100 percent sure that the good performance of SSL methods is partially or primarily due to the effect brought by the pretrained models. We think that </a:t>
+              <a:t>Another research manages to show that Semi-supervised learning methods outperform some existing UDA methods on UDA benchmark. But one thing to note here is that in this paper, the SSL methods and UDA methods employed the pretrained models on ImageNet dataset. We can not be 100 percent sure that the good performance of SSL methods on UDA benchmark datasets is partially or primarily due to the effect brought by the pretrained models. We think that </a:t>
             </a:r>
             <a:r>
               <a:rPr lang="en-US" altLang="zh-CN" sz="1200" kern="1200" dirty="0">
@@ -3808,7 +3781,7 @@
           <a:p>
             <a:r>
               <a:rPr kumimoji="1" lang="en-US" altLang="zh-CN" dirty="0"/>
-              <a:t>We think it will be a good starting point of our experiment, particularly taking into account of limited time we have in the experiments.</a:t>
+              <a:t>We think it will be a good starting point of our experiment.</a:t>
             </a:r>
           </a:p>
           <a:p>
@@ -49176,7 +49149,7 @@
         <p:spPr>
           <a:xfrm>
             <a:off x="402932" y="1138629"/>
-            <a:ext cx="3977640" cy="1090295"/>
+            <a:ext cx="3977640" cy="1254511"/>
           </a:xfrm>
           <a:prstGeom prst="rect">
             <a:avLst/>
@@ -49507,11 +49480,11 @@
               <a:t>the </a:t>
             </a:r>
             <a:r>
-              <a:rPr sz="1100" spc="-95" dirty="0">
-                <a:latin typeface="Arial"/>
-                <a:cs typeface="Arial"/>
-              </a:rPr>
-              <a:t>SSL </a:t>
+              <a:rPr lang="en-US" sz="1100" spc="-30" dirty="0">
+                <a:latin typeface="Arial"/>
+                <a:cs typeface="Arial"/>
+              </a:rPr>
+              <a:t>Semi-supervised learning(SSL) </a:t>
             </a:r>
             <a:r>
               <a:rPr sz="1100" spc="-55" dirty="0">
@@ -49535,11 +49508,32 @@
               <a:t>existing </a:t>
             </a:r>
             <a:r>
+              <a:rPr lang="en-US" sz="1100" spc="-40" dirty="0">
+                <a:latin typeface="Arial"/>
+                <a:cs typeface="Arial"/>
+              </a:rPr>
+              <a:t>unsupervised domain adaptation (</a:t>
+            </a:r>
+            <a:r>
               <a:rPr sz="1100" spc="-30" dirty="0">
                 <a:latin typeface="Arial"/>
                 <a:cs typeface="Arial"/>
               </a:rPr>
-              <a:t>UDA </a:t>
+              <a:t>UDA</a:t>
+            </a:r>
+            <a:r>
+              <a:rPr lang="en-US" sz="1100" spc="-30" dirty="0">
+                <a:latin typeface="Arial"/>
+                <a:cs typeface="Arial"/>
+              </a:rPr>
+              <a:t>)</a:t>
+            </a:r>
+            <a:r>
+              <a:rPr sz="1100" spc="-30" dirty="0">
+                <a:latin typeface="Arial"/>
+                <a:cs typeface="Arial"/>
+              </a:rPr>
+              <a:t> </a:t>
             </a:r>
             <a:r>
               <a:rPr sz="1100" spc="-55" dirty="0">

</xml_diff>

<commit_message>
update of slurm files for the pretrained-network of alexnet
</commit_message>
<xml_diff>
--- a/reports_and_presentation/Summer_Project_Presentation_ver3.0.pptx
+++ b/reports_and_presentation/Summer_Project_Presentation_ver3.0.pptx
@@ -242,7 +242,7 @@
           <a:p>
             <a:fld id="{3FFB73A2-7F28-BF4D-B579-BB0713717021}" type="datetimeFigureOut">
               <a:rPr kumimoji="1" lang="zh-CN" altLang="en-US" smtClean="0"/>
-              <a:t>2022/2/27</a:t>
+              <a:t>2022/3/1</a:t>
             </a:fld>
             <a:endParaRPr kumimoji="1" lang="zh-CN" altLang="en-US"/>
           </a:p>
@@ -561,7 +561,7 @@
           <a:p>
             <a:r>
               <a:rPr kumimoji="1" lang="en-US" altLang="zh-CN" dirty="0"/>
-              <a:t>% The topic of my project is Rethinking ImageNet Pretraining in Domain Adaptation, and my project is by Dr Gong.</a:t>
+              <a:t>% The topic of my project is Rethinking ImageNet Pretraining in Domain Adaptation, and my project is by Dr Gong. </a:t>
             </a:r>
             <a:endParaRPr kumimoji="1" lang="zh-CN" altLang="en-US" dirty="0"/>
           </a:p>
@@ -649,7 +649,13 @@
           <a:p>
             <a:r>
               <a:rPr kumimoji="1" lang="en-US" altLang="zh-CN" dirty="0"/>
-              <a:t>It is one of possible ways to define general UDA problems.</a:t>
+              <a:t>Then we look at the concept of UDA problem.</a:t>
+            </a:r>
+          </a:p>
+          <a:p>
+            <a:r>
+              <a:rPr kumimoji="1" lang="en-US" altLang="zh-CN" dirty="0"/>
+              <a:t>Here we present one possible way to define general UDA problems.</a:t>
             </a:r>
           </a:p>
           <a:p>
@@ -658,7 +664,15 @@
           <a:p>
             <a:r>
               <a:rPr kumimoji="1" lang="en-US" altLang="zh-CN" dirty="0"/>
-              <a:t>We have ns labeled samples of set Ds which contains a pair of x and y values from source domain.</a:t>
+              <a:t>We have ns number of labeled samples of set Ds which contains all pairs of x and y values from source </a:t>
+            </a:r>
+            <a:r>
+              <a:rPr kumimoji="1" lang="en-US" altLang="zh-CN" dirty="0" err="1"/>
+              <a:t>domainn</a:t>
+            </a:r>
+            <a:r>
+              <a:rPr kumimoji="1" lang="en-US" altLang="zh-CN" dirty="0"/>
+              <a:t>.</a:t>
             </a:r>
           </a:p>
           <a:p>
@@ -675,13 +689,21 @@
             </a:r>
             <a:r>
               <a:rPr kumimoji="1" lang="en-US" altLang="zh-CN" dirty="0"/>
-              <a:t> unlabeled samples of set Dt which only x values only and we assume that for every single x in Dt, there exists a corresponding unknown label of y'.</a:t>
-            </a:r>
-          </a:p>
-          <a:p>
+              <a:t> number of unlabeled samples of set Dt which has </a:t>
+            </a:r>
+            <a:r>
+              <a:rPr kumimoji="1" lang="en-US" altLang="zh-CN" dirty="0" err="1"/>
+              <a:t>nly</a:t>
+            </a:r>
             <a:r>
               <a:rPr kumimoji="1" lang="en-US" altLang="zh-CN" dirty="0"/>
-              <a:t>The main goal of UDA: we want to build a classifier C that minimizes the target risk the expectation of the absolute value of the difference between C(x) and </a:t>
+              <a:t> x values and we assume that for every single x value in set Dt, there exists a corresponding unknown label of y'.</a:t>
+            </a:r>
+          </a:p>
+          <a:p>
+            <a:r>
+              <a:rPr kumimoji="1" lang="en-US" altLang="zh-CN" dirty="0"/>
+              <a:t>The main goal of UDA problem is we want to build a classifier C that minimizes the target risk, which is the expectation of the absolute value of the difference between C(x) and </a:t>
             </a:r>
             <a:r>
               <a:rPr kumimoji="1" lang="en-US" altLang="zh-CN" dirty="0" err="1"/>
@@ -697,7 +719,7 @@
             </a:r>
             <a:r>
               <a:rPr kumimoji="1" lang="en-US" altLang="zh-CN" dirty="0"/>
-              <a:t>) of target domain  </a:t>
+              <a:t>) of target domain.</a:t>
             </a:r>
           </a:p>
         </p:txBody>
@@ -784,7 +806,7 @@
           <a:p>
             <a:r>
               <a:rPr kumimoji="1" lang="en-US" altLang="zh-CN" dirty="0"/>
-              <a:t>Currently, there are two main approaches of UDA tasks:</a:t>
+              <a:t>Currently, there are two main approaches, or directions of general UDA tasks:</a:t>
             </a:r>
           </a:p>
           <a:p>
@@ -793,7 +815,7 @@
           <a:p>
             <a:r>
               <a:rPr kumimoji="1" lang="en-US" altLang="zh-CN" dirty="0"/>
-              <a:t>One direction is to use Domain-invariant feature learning. </a:t>
+              <a:t>One direction is to use Domain-invariant feature learning which </a:t>
             </a:r>
             <a:r>
               <a:rPr lang="en-US" altLang="zh-CN" sz="1200" kern="1200" dirty="0">
@@ -805,10 +827,17 @@
                 <a:ea typeface="+mn-ea"/>
                 <a:cs typeface="+mn-cs"/>
               </a:rPr>
-              <a:t>Domain-invariant feature learning[17] aims to align the source and target domain by generating</a:t>
-            </a:r>
-          </a:p>
-          <a:p>
+              <a:t>aims to align the source and target domain by generating a feature representation common to both domains. </a:t>
+            </a:r>
+          </a:p>
+          <a:p>
+            <a:endParaRPr kumimoji="1" lang="en-US" altLang="zh-CN" dirty="0"/>
+          </a:p>
+          <a:p>
+            <a:r>
+              <a:rPr kumimoji="1" lang="en-US" altLang="zh-CN" dirty="0"/>
+              <a:t>Another direction is through domain mapping, which</a:t>
+            </a:r>
             <a:r>
               <a:rPr lang="en-US" altLang="zh-CN" sz="1200" kern="1200" dirty="0">
                 <a:solidFill>
@@ -819,39 +848,7 @@
                 <a:ea typeface="+mn-ea"/>
                 <a:cs typeface="+mn-cs"/>
               </a:rPr>
-              <a:t>a feature representation common to both domains. </a:t>
-            </a:r>
-          </a:p>
-          <a:p>
-            <a:endParaRPr kumimoji="1" lang="en-US" altLang="zh-CN" sz="1200" kern="1200" dirty="0">
-              <a:solidFill>
-                <a:schemeClr val="tx1"/>
-              </a:solidFill>
-              <a:effectLst/>
-              <a:latin typeface="+mn-lt"/>
-              <a:ea typeface="+mn-ea"/>
-              <a:cs typeface="+mn-cs"/>
-            </a:endParaRPr>
-          </a:p>
-          <a:p>
-            <a:endParaRPr kumimoji="1" lang="en-US" altLang="zh-CN" dirty="0"/>
-          </a:p>
-          <a:p>
-            <a:r>
-              <a:rPr kumimoji="1" lang="en-US" altLang="zh-CN" dirty="0"/>
-              <a:t>Another direction is through domain mapping.</a:t>
-            </a:r>
-            <a:r>
-              <a:rPr lang="en-US" altLang="zh-CN" sz="1200" kern="1200" dirty="0">
-                <a:solidFill>
-                  <a:schemeClr val="tx1"/>
-                </a:solidFill>
-                <a:effectLst/>
-                <a:latin typeface="+mn-lt"/>
-                <a:ea typeface="+mn-ea"/>
-                <a:cs typeface="+mn-cs"/>
-              </a:rPr>
-              <a:t> The domain mapping aims to find the best mapping directly from one domain to another so that the input values can be mapped into the domain that has known labels to train a classifier.</a:t>
+              <a:t> aims to find the best mapping directly from one domain to another so that the input values can be mapped into the domain(it could be target or source domains, it depends) that has known labels to train a classifier.</a:t>
             </a:r>
           </a:p>
           <a:p>
@@ -1074,7 +1071,15 @@
           <a:p>
             <a:r>
               <a:rPr kumimoji="1" lang="en-US" altLang="zh-CN" dirty="0"/>
-              <a:t> % It is based on the main ideas of Domain-invariant feature learning.  </a:t>
+              <a:t> % This type of NN s based on the main ideas of Domain-invariant feature learning and </a:t>
+            </a:r>
+            <a:r>
+              <a:rPr kumimoji="1" lang="en-US" altLang="zh-CN" dirty="0" err="1"/>
+              <a:t>adversial</a:t>
+            </a:r>
+            <a:r>
+              <a:rPr kumimoji="1" lang="en-US" altLang="zh-CN" dirty="0"/>
+              <a:t> approach.  </a:t>
             </a:r>
           </a:p>
           <a:p>
@@ -1088,7 +1093,7 @@
             </a:r>
             <a:r>
               <a:rPr kumimoji="1" lang="en-US" altLang="zh-CN" dirty="0"/>
-              <a:t> approach, that means they compete against each other, the feature extractor tries to create the best feature representation that fool the classification of the domain classifier and the domain classifier will try their best to classify the output of feature extractor whether its input of the feature extractor comes from the source and target domains or not</a:t>
+              <a:t> approach, that means they compete against each other, the feature extractor tries to create the best feature representation that fool the classification of the domain classifier and the domain classifier will try their best to classify the output of feature extractor to see whether its input of the feature extractor comes from the source and target domains or not</a:t>
             </a:r>
           </a:p>
           <a:p>
@@ -1103,7 +1108,7 @@
           <a:p>
             <a:r>
               <a:rPr kumimoji="1" lang="en-US" altLang="zh-CN" dirty="0"/>
-              <a:t>The weight of three components of the DANN will be updated at the same time.</a:t>
+              <a:t>The weight of three components of the DANN will be updated at the same time during the training.</a:t>
             </a:r>
           </a:p>
         </p:txBody>
@@ -1190,7 +1195,7 @@
           <a:p>
             <a:r>
               <a:rPr kumimoji="1" lang="en-US" altLang="zh-CN" dirty="0"/>
-              <a:t>The notion of the semi-supervised learning are very similar to formulation of UDA, but we typically assume that the labeled samples and unlabeled samples come from the the same distribution.</a:t>
+              <a:t>The notion of the semi-supervised learning are very similar to formulation of general UDA, but we typically assume that the labeled samples and unlabeled samples come from the the same distribution.</a:t>
             </a:r>
           </a:p>
         </p:txBody>
@@ -1277,7 +1282,7 @@
           <a:p>
             <a:r>
               <a:rPr kumimoji="1" lang="en-US" altLang="zh-CN" dirty="0"/>
-              <a:t>In the SSL setting, we choose the Pseudo-label method as the study object for our experiments.</a:t>
+              <a:t>In the SSL setting, we  choose the Pseudo-label method as the study object for our experiments.</a:t>
             </a:r>
           </a:p>
           <a:p>
@@ -1373,12 +1378,6 @@
           <a:p>
             <a:r>
               <a:rPr kumimoji="1" lang="en-US" altLang="zh-CN" dirty="0"/>
-              <a:t>Here is the graphical illustration of Pseudo-label method.</a:t>
-            </a:r>
-          </a:p>
-          <a:p>
-            <a:r>
-              <a:rPr kumimoji="1" lang="en-US" altLang="zh-CN" dirty="0"/>
               <a:t>Firstly, we trained the network with our labeled data and use the trained model to predict labels for the unlabeled data.</a:t>
             </a:r>
           </a:p>
@@ -1391,7 +1390,7 @@
           <a:p>
             <a:r>
               <a:rPr kumimoji="1" lang="en-US" altLang="zh-CN" dirty="0"/>
-              <a:t>We treat the set of unlabeled data with our pseudo-labels as the ”true ”label data to retrained the model again we repeated the process until all unlabeled data are labeled with our Pseudo-label.</a:t>
+              <a:t>We treat the set of unlabeled data with our pseudo-labels as the ”true ”label data to retrained the model again we repeated the process until all unlabeled data are labeled with Pseudo-labels in this method.</a:t>
             </a:r>
           </a:p>
           <a:p>
@@ -1493,14 +1492,39 @@
           <a:p>
             <a:r>
               <a:rPr kumimoji="1" lang="en-US" altLang="zh-CN" dirty="0"/>
-              <a:t>In addition, the two datasets are ImageNet and Office31 </a:t>
+              <a:t>In addition, the two datasets we use in our experiment are ImageNet and Office31 </a:t>
             </a:r>
           </a:p>
           <a:p>
             <a:r>
               <a:rPr kumimoji="1" lang="en-US" altLang="zh-CN" dirty="0"/>
-              <a:t>Note that we are going to use the face-blurred version of ImageNet as a dataset to train the pretrained model</a:t>
-            </a:r>
+              <a:t>The </a:t>
+            </a:r>
+            <a:r>
+              <a:rPr kumimoji="1" lang="en-US" altLang="zh-CN" dirty="0" err="1"/>
+              <a:t>imagenet</a:t>
+            </a:r>
+            <a:r>
+              <a:rPr kumimoji="1" lang="en-US" altLang="zh-CN" dirty="0"/>
+              <a:t> dataset we used is the face-blurred version so as protect the privacy issue. </a:t>
+            </a:r>
+          </a:p>
+          <a:p>
+            <a:r>
+              <a:rPr kumimoji="1" lang="en-US" altLang="zh-CN" dirty="0"/>
+              <a:t>The </a:t>
+            </a:r>
+            <a:r>
+              <a:rPr kumimoji="1" lang="en-US" altLang="zh-CN" dirty="0" err="1"/>
+              <a:t>imageNet</a:t>
+            </a:r>
+            <a:r>
+              <a:rPr kumimoji="1" lang="en-US" altLang="zh-CN" dirty="0"/>
+              <a:t> dataset will mainly trained as the pretrained models.</a:t>
+            </a:r>
+          </a:p>
+          <a:p>
+            <a:endParaRPr kumimoji="1" lang="en-US" altLang="zh-CN" dirty="0"/>
           </a:p>
           <a:p>
             <a:r>
@@ -1608,13 +1632,21 @@
           <a:p>
             <a:r>
               <a:rPr kumimoji="1" lang="en-US" altLang="zh-CN" dirty="0"/>
-              <a:t>We have three datasets, </a:t>
-            </a:r>
-          </a:p>
-          <a:p>
+              <a:t>We have three datasets for </a:t>
+            </a:r>
+            <a:r>
+              <a:rPr kumimoji="1" lang="en-US" altLang="zh-CN" dirty="0" err="1"/>
+              <a:t>pretarining</a:t>
+            </a:r>
             <a:r>
               <a:rPr kumimoji="1" lang="en-US" altLang="zh-CN" dirty="0"/>
-              <a:t>We first create two modified datasets from the ImageNet,</a:t>
+              <a:t>, </a:t>
+            </a:r>
+          </a:p>
+          <a:p>
+            <a:r>
+              <a:rPr kumimoji="1" lang="en-US" altLang="zh-CN" dirty="0"/>
+              <a:t>We  create two modified datasets from the ImageNet,</a:t>
             </a:r>
             <a:br>
               <a:rPr kumimoji="1" lang="en-US" altLang="zh-CN" dirty="0"/>
@@ -1627,13 +1659,21 @@
           <a:p>
             <a:r>
               <a:rPr kumimoji="1" lang="en-US" altLang="zh-CN" dirty="0"/>
-              <a:t>Another Dataset we randomly masked classes labels that has the same number of selected masked class labels above.</a:t>
+              <a:t>Another Dataset we simply randomly masked classes labels that has the same number of selected masked class labels above. Of course, the randomly masked classes labels will not include the masked classes labels from the above dataset. </a:t>
             </a:r>
           </a:p>
           <a:p>
             <a:r>
               <a:rPr kumimoji="1" lang="en-US" altLang="zh-CN" dirty="0"/>
-              <a:t>In addition, We also use the original ImageNet as a control group to compare the results of the models. </a:t>
+              <a:t>In addition, We also use the original ImageNet as a </a:t>
+            </a:r>
+            <a:r>
+              <a:rPr kumimoji="1" lang="en-US" altLang="zh-CN" dirty="0" err="1"/>
+              <a:t>comparsion</a:t>
+            </a:r>
+            <a:r>
+              <a:rPr kumimoji="1" lang="en-US" altLang="zh-CN" dirty="0"/>
+              <a:t> group to see the results of the pretrained models. </a:t>
             </a:r>
           </a:p>
           <a:p>
@@ -1642,7 +1682,7 @@
           <a:p>
             <a:r>
               <a:rPr kumimoji="1" lang="en-US" altLang="zh-CN" dirty="0"/>
-              <a:t>Then, we trained the Alex-net models on the three datasets as the pre-trained models and the pretrained models will be utilized as the feature extractors to fine-tune the source-only, DANN and Pseudo-label methods on the UDA tasks. </a:t>
+              <a:t>Then, we trained the Alex-net models on these three datasets as the pre-trained models and the models will be utilized as the feature extractors to fine-tune the source-only, DANN and Pseudo-label methods on the 6 UDA tasks. </a:t>
             </a:r>
           </a:p>
         </p:txBody>
@@ -1993,6 +2033,12 @@
           <a:p>
             <a:r>
               <a:rPr kumimoji="1" lang="en-US" altLang="zh-CN" dirty="0"/>
+              <a:t>In terms of pretrained results.  </a:t>
+            </a:r>
+          </a:p>
+          <a:p>
+            <a:r>
+              <a:rPr kumimoji="1" lang="en-US" altLang="zh-CN" dirty="0"/>
               <a:t>Pre-trained models of Alex-net trained on three datasets converge at 100 epochs with overall top-1 accuracy of around 55 ± 0.5%. </a:t>
             </a:r>
           </a:p>
@@ -2108,7 +2154,15 @@
           <a:p>
             <a:r>
               <a:rPr kumimoji="1" lang="en-US" altLang="zh-CN" dirty="0"/>
-              <a:t>Nonetheless, our results are still behind that of the original paper which achieved the top-1 of about 60 \%but considering of non-identical dataset and the coding platform used in implementing this architecture and training the model, we believe that there is still a room of improvement of classification accuracy after the hyperparameter optimization. </a:t>
+              <a:t>Nonetheless, our results are still behind that of the original paper which achieved the top-1 classification </a:t>
+            </a:r>
+            <a:r>
+              <a:rPr kumimoji="1" lang="en-US" altLang="zh-CN" dirty="0" err="1"/>
+              <a:t>accuarcy</a:t>
+            </a:r>
+            <a:r>
+              <a:rPr kumimoji="1" lang="en-US" altLang="zh-CN" dirty="0"/>
+              <a:t> of about 60 \% but considering usage of non-identical dataset and the coding platform used in implementing this architecture and training the model, we believe that there is still a room of improvement of classification accuracy after the hyperparameter optimization. </a:t>
             </a:r>
           </a:p>
           <a:p>
@@ -2117,7 +2171,7 @@
           <a:p>
             <a:r>
               <a:rPr kumimoji="1" lang="en-US" altLang="zh-CN" dirty="0"/>
-              <a:t>The validation accuracy on models with 1000 classes also does not exhibit/show inferior performance over the models (Random and Masked Datasets) with fewer classes, and it takes more training iterations to reach top-1 accuracy of 55 %.</a:t>
+              <a:t>The validation accuracy on models with 1000 classes also does not show inferior performance over the models (Random and Masked Datasets) with fewer classes, and it takes more training iterations to reach top-1 accuracy of 55 %.</a:t>
             </a:r>
             <a:endParaRPr kumimoji="1" lang="zh-CN" altLang="en-US" dirty="0"/>
           </a:p>
@@ -2296,7 +2350,24 @@
           <a:p>
             <a:r>
               <a:rPr kumimoji="1" lang="en-US" altLang="zh-CN" dirty="0"/>
-              <a:t>% From the table above(Domain Adaptation methods), we observe in general that using DANN and source-only methods, the domain adaptation tasks perform better on the pretrained model trained on the random dataset. The average increase in domain transfer accuracy with the respect to the choice of dataset of pretrained models is more obvious to DANN methods, up to 1.36 \%. Similarly, the Pseudo-label models pretrained on "Random" Dataset have the higher accuracy than that of the models pretrained on "Masked" dataset.</a:t>
+              <a:t>In terms of domain </a:t>
+            </a:r>
+            <a:r>
+              <a:rPr kumimoji="1" lang="en-US" altLang="zh-CN" dirty="0" err="1"/>
+              <a:t>apdataion</a:t>
+            </a:r>
+            <a:r>
+              <a:rPr kumimoji="1" lang="en-US" altLang="zh-CN" dirty="0"/>
+              <a:t> methods</a:t>
+            </a:r>
+          </a:p>
+          <a:p>
+            <a:endParaRPr kumimoji="1" lang="en-US" altLang="zh-CN" dirty="0"/>
+          </a:p>
+          <a:p>
+            <a:r>
+              <a:rPr kumimoji="1" lang="en-US" altLang="zh-CN" dirty="0"/>
+              <a:t>From the table above(Domain Adaptation methods), we observe in general that using DANN and source-only methods, the domain adaptation tasks perform better on the pretrained model trained on the random dataset. The average increase in domain transfer accuracy with the respect to the choice of dataset of pretrained models is more obvious to DANN methods, up to 1.36 \%. Similarly, the Pseudo-label models pretrained on "Random" Dataset have the higher accuracy than that of the models pretrained on "Masked" dataset.</a:t>
             </a:r>
           </a:p>
           <a:p>
@@ -2422,7 +2493,7 @@
           <a:p>
             <a:r>
               <a:rPr kumimoji="1" lang="en-US" altLang="zh-CN" dirty="0"/>
-              <a:t>% Examining more detailed level, the accuracy difference between domains for three methods does not give a consistent pattern,  for example, W -&gt; D , D -&gt; A and D -&gt; W,  these domain adaptation tasks experience a decrease in accuracy in at least one of three methods when the dataset of pre-trained model changing from Masked to Random. </a:t>
+              <a:t>% But if we examine more detailed level, the accuracy difference between domains for three methods does not give a consistent pattern,  for example, W -&gt; D , D -&gt; A and D -&gt; W,  these domain adaptation tasks experience a decrease in accuracy in at least one of three methods when the dataset of pre-trained model changing from Masked to Random. </a:t>
             </a:r>
           </a:p>
           <a:p>
@@ -2431,7 +2502,19 @@
           <a:p>
             <a:r>
               <a:rPr kumimoji="1" lang="en-US" altLang="zh-CN" dirty="0"/>
-              <a:t>% We think the results obtained in first Table are affected by the certain level of randomness, and during the phase of fine-tuning, it is possible for some models to learn actual features quicker in the domain adaptation tasks, even though they are slightly different in initialization weights from pretrained model or even have a slight advantage of pretrained weights over others.</a:t>
+              <a:t>% We think the results obtained in first Table are affected by the certain level of randomness, and during the phase of fine-tuning, it is possible for some models to learn actual features quicker in the domain adaptation tasks, even though they are slightly different in initialization weights from pretrained models.</a:t>
+            </a:r>
+          </a:p>
+          <a:p>
+            <a:r>
+              <a:rPr kumimoji="1" lang="en-US" altLang="zh-CN" dirty="0"/>
+              <a:t> </a:t>
+            </a:r>
+          </a:p>
+          <a:p>
+            <a:r>
+              <a:rPr kumimoji="1" lang="en-US" altLang="zh-CN" dirty="0"/>
+              <a:t> To avoid the weights being updated too much in our experiment when evaluating, we examine through the domain  adaptation tasks result at the first stage of fine-tuning training. </a:t>
             </a:r>
           </a:p>
           <a:p>
@@ -2439,9 +2522,42 @@
           </a:p>
           <a:p>
             <a:r>
-              <a:rPr kumimoji="1" lang="en-US" altLang="zh-CN" dirty="0"/>
-              <a:t> To avoid the weights being updated too much in our experiment when evaluating, we examine through the domain  adaptation tasks result at the first epoch of fine-tuning training. </a:t>
-            </a:r>
+              <a:rPr lang="en-US" altLang="zh-CN" sz="1200" kern="1200" dirty="0">
+                <a:solidFill>
+                  <a:schemeClr val="tx1"/>
+                </a:solidFill>
+                <a:effectLst/>
+                <a:latin typeface="+mn-lt"/>
+                <a:ea typeface="+mn-ea"/>
+                <a:cs typeface="+mn-cs"/>
+              </a:rPr>
+              <a:t>Despite</a:t>
+            </a:r>
+            <a:r>
+              <a:rPr lang="zh-CN" altLang="en-US" sz="1200" kern="1200" dirty="0">
+                <a:solidFill>
+                  <a:schemeClr val="tx1"/>
+                </a:solidFill>
+                <a:effectLst/>
+                <a:latin typeface="+mn-lt"/>
+                <a:ea typeface="+mn-ea"/>
+                <a:cs typeface="+mn-cs"/>
+              </a:rPr>
+              <a:t> </a:t>
+            </a:r>
+            <a:r>
+              <a:rPr lang="en-US" altLang="zh-CN" sz="1200" kern="1200" dirty="0">
+                <a:solidFill>
+                  <a:schemeClr val="tx1"/>
+                </a:solidFill>
+                <a:effectLst/>
+                <a:latin typeface="+mn-lt"/>
+                <a:ea typeface="+mn-ea"/>
+                <a:cs typeface="+mn-cs"/>
+              </a:rPr>
+              <a:t>our efforts, we still observe the alternating changing patterns of mean accuracy on some six domain adaptation tasks. It seems that masking some classes in the pretrained model’s dataset does not prevent the learning of relevant features in the pretrained dataset associated with Office31.</a:t>
+            </a:r>
+            <a:endParaRPr kumimoji="1" lang="en-US" altLang="zh-CN" dirty="0"/>
           </a:p>
           <a:p>
             <a:endParaRPr kumimoji="1" lang="en-US" altLang="zh-CN" dirty="0"/>
@@ -2530,24 +2646,16 @@
           <a:p>
             <a:r>
               <a:rPr kumimoji="1" lang="en-US" altLang="zh-CN" dirty="0"/>
-              <a:t>we proposed the following explanations </a:t>
-            </a:r>
-            <a:r>
-              <a:rPr kumimoji="1" lang="en-US" altLang="zh-CN"/>
-              <a:t>for these observations </a:t>
-            </a:r>
+              <a:t>So we proposed the following explanations for these observations in our experiments.</a:t>
+            </a:r>
+          </a:p>
+          <a:p>
+            <a:endParaRPr kumimoji="1" lang="en-US" altLang="zh-CN" dirty="0"/>
+          </a:p>
+          <a:p>
             <a:r>
               <a:rPr kumimoji="1" lang="en-US" altLang="zh-CN" dirty="0"/>
-              <a:t>in the experiments.</a:t>
-            </a:r>
-          </a:p>
-          <a:p>
-            <a:endParaRPr kumimoji="1" lang="en-US" altLang="zh-CN" dirty="0"/>
-          </a:p>
-          <a:p>
-            <a:r>
-              <a:rPr kumimoji="1" lang="en-US" altLang="zh-CN" dirty="0"/>
-              <a:t> % 1. The further actions were required to make sure the hyperparameters and training environment of the models are optimal in the current Office31 domain adaptation tasks. </a:t>
+              <a:t> % 1. More actions were required to make sure the hyperparameters and training environment of the models are optimal in the current Office31 domain adaptation tasks. </a:t>
             </a:r>
           </a:p>
           <a:p>
@@ -2565,7 +2673,7 @@
           <a:p>
             <a:r>
               <a:rPr kumimoji="1" lang="en-US" altLang="zh-CN" dirty="0"/>
-              <a:t>% 3. For instance, should we mask the class label of bottle-cap if we intend to avoid the Neural Network to learn the feature of bottle as well? </a:t>
+              <a:t>% 3. For instance, should we mask the class label of bottle-cap if we intend to avoid the Neural Network to learn the feature of bottle as well? For some images of bottle-cap, the NN could use the information of the bottle to help classify the bottle-cap. Whether this type of situation will happen on the ImageNet, it still remain in doubt.  </a:t>
             </a:r>
           </a:p>
         </p:txBody>
@@ -2661,7 +2769,7 @@
           <a:p>
             <a:r>
               <a:rPr kumimoji="1" lang="en-US" altLang="zh-CN" dirty="0"/>
-              <a:t>The future directions of the further investigation of the pretraining effect could be</a:t>
+              <a:t>The future directions of our investigation of the pretraining effect could be on following three ways .</a:t>
             </a:r>
           </a:p>
           <a:p>
@@ -2679,7 +2787,7 @@
           <a:p>
             <a:r>
               <a:rPr kumimoji="1" lang="en-US" altLang="zh-CN" dirty="0"/>
-              <a:t>3. employing more UDA methods on different evolution UDA datasets. </a:t>
+              <a:t>3. employing more DA methods other than DANN on different domain adaptation datasets. </a:t>
             </a:r>
             <a:endParaRPr kumimoji="1" lang="zh-CN" altLang="en-US" dirty="0"/>
           </a:p>
@@ -2765,7 +2873,19 @@
           <a:bodyPr/>
           <a:lstStyle/>
           <a:p>
-            <a:endParaRPr kumimoji="1" lang="zh-CN" altLang="en-US" dirty="0"/>
+            <a:r>
+              <a:rPr kumimoji="1" lang="en-US" altLang="zh-CN" dirty="0"/>
+              <a:t>Lastly, I would like to thank Dr Gong, my supervisor who guide me through 8-weeks project.</a:t>
+            </a:r>
+          </a:p>
+          <a:p>
+            <a:endParaRPr kumimoji="1" lang="en-US" altLang="zh-CN" dirty="0"/>
+          </a:p>
+          <a:p>
+            <a:r>
+              <a:rPr kumimoji="1" lang="en-US" altLang="zh-CN" dirty="0"/>
+              <a:t>That is the end of my presentation!</a:t>
+            </a:r>
           </a:p>
         </p:txBody>
       </p:sp>
@@ -2796,6 +2916,90 @@
     <p:extLst>
       <p:ext uri="{BB962C8B-B14F-4D97-AF65-F5344CB8AC3E}">
         <p14:creationId xmlns:p14="http://schemas.microsoft.com/office/powerpoint/2010/main" val="1075153308"/>
+      </p:ext>
+    </p:extLst>
+  </p:cSld>
+  <p:clrMapOvr>
+    <a:masterClrMapping/>
+  </p:clrMapOvr>
+</p:notes>
+</file>
+
+<file path=ppt/notesSlides/notesSlide29.xml><?xml version="1.0" encoding="utf-8"?>
+<p:notes xmlns:a="http://schemas.openxmlformats.org/drawingml/2006/main" xmlns:r="http://schemas.openxmlformats.org/officeDocument/2006/relationships" xmlns:p="http://schemas.openxmlformats.org/presentationml/2006/main">
+  <p:cSld>
+    <p:spTree>
+      <p:nvGrpSpPr>
+        <p:cNvPr id="1" name=""/>
+        <p:cNvGrpSpPr/>
+        <p:nvPr/>
+      </p:nvGrpSpPr>
+      <p:grpSpPr>
+        <a:xfrm>
+          <a:off x="0" y="0"/>
+          <a:ext cx="0" cy="0"/>
+          <a:chOff x="0" y="0"/>
+          <a:chExt cx="0" cy="0"/>
+        </a:xfrm>
+      </p:grpSpPr>
+      <p:sp>
+        <p:nvSpPr>
+          <p:cNvPr id="2" name="幻灯片图像占位符 1"/>
+          <p:cNvSpPr>
+            <a:spLocks noGrp="1" noRot="1" noChangeAspect="1"/>
+          </p:cNvSpPr>
+          <p:nvPr>
+            <p:ph type="sldImg"/>
+          </p:nvPr>
+        </p:nvSpPr>
+        <p:spPr/>
+      </p:sp>
+      <p:sp>
+        <p:nvSpPr>
+          <p:cNvPr id="3" name="备注占位符 2"/>
+          <p:cNvSpPr>
+            <a:spLocks noGrp="1"/>
+          </p:cNvSpPr>
+          <p:nvPr>
+            <p:ph type="body" idx="1"/>
+          </p:nvPr>
+        </p:nvSpPr>
+        <p:spPr/>
+        <p:txBody>
+          <a:bodyPr/>
+          <a:lstStyle/>
+          <a:p>
+            <a:endParaRPr kumimoji="1" lang="zh-CN" altLang="en-US"/>
+          </a:p>
+        </p:txBody>
+      </p:sp>
+      <p:sp>
+        <p:nvSpPr>
+          <p:cNvPr id="4" name="灯片编号占位符 3"/>
+          <p:cNvSpPr>
+            <a:spLocks noGrp="1"/>
+          </p:cNvSpPr>
+          <p:nvPr>
+            <p:ph type="sldNum" sz="quarter" idx="5"/>
+          </p:nvPr>
+        </p:nvSpPr>
+        <p:spPr/>
+        <p:txBody>
+          <a:bodyPr/>
+          <a:lstStyle/>
+          <a:p>
+            <a:fld id="{26E87434-BF40-0A4C-A003-A1FC0CA8847C}" type="slidenum">
+              <a:rPr kumimoji="1" lang="zh-CN" altLang="en-US" smtClean="0"/>
+              <a:t>34</a:t>
+            </a:fld>
+            <a:endParaRPr kumimoji="1" lang="zh-CN" altLang="en-US"/>
+          </a:p>
+        </p:txBody>
+      </p:sp>
+    </p:spTree>
+    <p:extLst>
+      <p:ext uri="{BB962C8B-B14F-4D97-AF65-F5344CB8AC3E}">
+        <p14:creationId xmlns:p14="http://schemas.microsoft.com/office/powerpoint/2010/main" val="937354948"/>
       </p:ext>
     </p:extLst>
   </p:cSld>
@@ -2851,13 +3055,7 @@
           <a:p>
             <a:r>
               <a:rPr kumimoji="1" lang="en-US" altLang="zh-CN" dirty="0"/>
-              <a:t>% This project spans 8 weeks during this summer term.</a:t>
-            </a:r>
-          </a:p>
-          <a:p>
-            <a:r>
-              <a:rPr kumimoji="1" lang="en-US" altLang="zh-CN" dirty="0"/>
-              <a:t>% The first two weeks get familiar with the high computing platform at Spartan and understand the context of our experiment and research.</a:t>
+              <a:t>% The first two weeks get familiar with the high computing platform at Spartan and understand the context of our research.</a:t>
             </a:r>
           </a:p>
           <a:p>
@@ -2869,13 +3067,13 @@
           <a:p>
             <a:r>
               <a:rPr kumimoji="1" lang="en-US" altLang="zh-CN" dirty="0"/>
-              <a:t>% Figure out the ways to solve the problems in the experiments and collect the data for report writing</a:t>
+              <a:t>% Figure out the ways to solve the problems found in the experiments and collect the data for report writing</a:t>
             </a:r>
           </a:p>
           <a:p>
             <a:r>
               <a:rPr kumimoji="1" lang="en-US" altLang="zh-CN" dirty="0"/>
-              <a:t>% For the last week, we write the report and prepare for the presentation</a:t>
+              <a:t>% In the last week, we write the report and prepare for the presentation</a:t>
             </a:r>
           </a:p>
         </p:txBody>
@@ -2962,21 +3160,28 @@
           <a:p>
             <a:r>
               <a:rPr kumimoji="1" lang="en-US" altLang="zh-CN" dirty="0"/>
-              <a:t>For context of our project</a:t>
+              <a:t>In term of the context of our project</a:t>
             </a:r>
           </a:p>
           <a:p>
             <a:r>
               <a:rPr kumimoji="1" lang="en-US" altLang="zh-CN" dirty="0"/>
-              <a:t>We know the pretrained models’ weight can be used </a:t>
-            </a:r>
-            <a:r>
-              <a:rPr kumimoji="1" lang="en-US" altLang="zh-CN"/>
-              <a:t>as an </a:t>
-            </a:r>
+              <a:t>We know the pretrained models’ weight can be used as an initialization weight for training the NN models in various tasks .</a:t>
+            </a:r>
+          </a:p>
+          <a:p>
+            <a:endParaRPr kumimoji="1" lang="en-US" altLang="zh-CN" dirty="0"/>
+          </a:p>
+          <a:p>
             <a:r>
               <a:rPr kumimoji="1" lang="en-US" altLang="zh-CN" dirty="0"/>
-              <a:t>initialization for training the NN models in various tasks .</a:t>
+              <a:t>For most of cases, it is more preferred to use the larger dataset to train pretrained models in order to obtain the better model generality.</a:t>
+            </a:r>
+          </a:p>
+          <a:p>
+            <a:r>
+              <a:rPr kumimoji="1" lang="en-US" altLang="zh-CN" dirty="0"/>
+              <a:t>In an area of computer vision, ImageNet is usually very good option for pretrained models to train on.</a:t>
             </a:r>
           </a:p>
           <a:p>
@@ -2985,22 +3190,7 @@
           <a:p>
             <a:r>
               <a:rPr kumimoji="1" lang="en-US" altLang="zh-CN" dirty="0"/>
-              <a:t>For most of cases, it is preferred to use the larger dataset to train pretrained models to obtain the better model generality.</a:t>
-            </a:r>
-          </a:p>
-          <a:p>
-            <a:r>
-              <a:rPr kumimoji="1" lang="en-US" altLang="zh-CN" dirty="0"/>
-              <a:t>In an area of computer vision, ImageNet is usually the first option for pretrained models to train on.</a:t>
-            </a:r>
-          </a:p>
-          <a:p>
-            <a:endParaRPr kumimoji="1" lang="en-US" altLang="zh-CN" dirty="0"/>
-          </a:p>
-          <a:p>
-            <a:r>
-              <a:rPr kumimoji="1" lang="en-US" altLang="zh-CN" dirty="0"/>
-              <a:t>In our project, we are going to focus on the pretraining effect of Image in the special case of the transfer learning, domain adaptation.</a:t>
+              <a:t>In our project, we are going to focus on the pretraining effect of ImageNet dataset in the special case of the transfer learning, domain adaptation.</a:t>
             </a:r>
           </a:p>
         </p:txBody>
@@ -3087,7 +3277,7 @@
           <a:p>
             <a:r>
               <a:rPr kumimoji="1" lang="en-US" altLang="zh-CN" dirty="0"/>
-              <a:t>Domain adaptation refers to the learning from source domain a model that can be used on another target domain</a:t>
+              <a:t>Domain adaptation refers to the learning from source domain a new model that can be used to perform the similar task on another target domain</a:t>
             </a:r>
           </a:p>
           <a:p>
@@ -3198,7 +3388,7 @@
             </a:pPr>
             <a:r>
               <a:rPr kumimoji="1" lang="en-US" altLang="zh-CN" dirty="0"/>
-              <a:t>% One recent research project suggests that </a:t>
+              <a:t>% One recent research paper suggests that </a:t>
             </a:r>
             <a:r>
               <a:rPr lang="en-US" altLang="zh-CN" sz="1200" spc="-50" dirty="0">
@@ -3469,7 +3659,7 @@
                 <a:ea typeface="+mn-ea"/>
                 <a:cs typeface="+mn-cs"/>
               </a:rPr>
-              <a:t>the pretrained model weights in specific UDA classification tasks like Office31 dataset</a:t>
+              <a:t>the pretrained model weights in specific UDA classification tasks</a:t>
             </a:r>
             <a:r>
               <a:rPr kumimoji="1" lang="en-US" altLang="zh-CN" sz="1200" kern="1200" dirty="0">
@@ -3506,7 +3696,7 @@
                 <a:ea typeface="+mn-ea"/>
                 <a:cs typeface="+mn-cs"/>
               </a:rPr>
-              <a:t>Another research manages to show that Semi-supervised learning methods outperform some existing UDA methods on UDA benchmark. But one thing to note here is that in this paper, the SSL methods and UDA methods employed the pretrained models on ImageNet dataset. We can not be 100 percent sure that the good performance of SSL methods on UDA benchmark datasets is partially or primarily due to the effect brought by the pretrained models. We think that </a:t>
+              <a:t>Another research manages to show that Semi-supervised learning methods outperform some existing UDA methods on UDA benchmark. But one thing to note here is that in this paper, the SSL methods and UDA methods employed the pretrained models trained on ImageNet dataset. We can not be 100 percent sure that the good performance of SSL methods on UDA benchmark datasets is or primarily due to the effect brought by methods itself and but not from the pretrained models. We think that </a:t>
             </a:r>
             <a:r>
               <a:rPr lang="en-US" altLang="zh-CN" sz="1200" kern="1200" dirty="0">
@@ -3532,10 +3722,20 @@
                 <a:ea typeface="+mn-ea"/>
                 <a:cs typeface="+mn-cs"/>
               </a:rPr>
-              <a:t>possible for the pre-trained networks to play a non-trivial role in reducing the domains gap, thereby</a:t>
-            </a:r>
-          </a:p>
-          <a:p>
+              <a:t>possible, in this </a:t>
+            </a:r>
+            <a:r>
+              <a:rPr lang="en-US" altLang="zh-CN" sz="1200" kern="1200" dirty="0" err="1">
+                <a:solidFill>
+                  <a:schemeClr val="tx1"/>
+                </a:solidFill>
+                <a:effectLst/>
+                <a:latin typeface="+mn-lt"/>
+                <a:ea typeface="+mn-ea"/>
+                <a:cs typeface="+mn-cs"/>
+              </a:rPr>
+              <a:t>scenories</a:t>
+            </a:r>
             <a:r>
               <a:rPr lang="en-US" altLang="zh-CN" sz="1200" kern="1200" dirty="0">
                 <a:solidFill>
@@ -3546,7 +3746,7 @@
                 <a:ea typeface="+mn-ea"/>
                 <a:cs typeface="+mn-cs"/>
               </a:rPr>
-              <a:t>overestimating the intrinsic functionality of current SSL methods and UDA methods.</a:t>
+              <a:t> ,for the pre-trained networks to play a non-trivial role in reducing the domains gap, thereby overestimating the model of current SSL methods and UDA methods.</a:t>
             </a:r>
             <a:endParaRPr kumimoji="1" lang="en-US" altLang="zh-CN" sz="1200" kern="1200" dirty="0">
               <a:solidFill>
@@ -3648,7 +3848,7 @@
           <a:p>
             <a:r>
               <a:rPr kumimoji="1" lang="en-US" altLang="zh-CN" dirty="0"/>
-              <a:t>The main goal of the project is to investigate how ImageNet Pretraining affect the unsupervised domain adaptation methods. </a:t>
+              <a:t>The main goal of the project is to investigate how ImageNet Pretraining affect the domain adaptation methods. </a:t>
             </a:r>
           </a:p>
           <a:p>
@@ -3657,7 +3857,7 @@
           <a:p>
             <a:r>
               <a:rPr kumimoji="1" lang="en-US" altLang="zh-CN" dirty="0"/>
-              <a:t>Specifically, we are going to look into muting some chosen ImageNet class labels of same or similar types in UDA benchmark datasets when training the pretrained models.</a:t>
+              <a:t>Specifically, we are going to  muting some chosen ImageNet class labels which we think are same or similar types in UDA benchmark datasets upon pretraining.</a:t>
             </a:r>
           </a:p>
         </p:txBody>
@@ -3743,8 +3943,12 @@
           <a:lstStyle/>
           <a:p>
             <a:r>
+              <a:rPr kumimoji="1" lang="en-US" altLang="zh-CN" dirty="0" err="1"/>
+              <a:t>THe</a:t>
+            </a:r>
+            <a:r>
               <a:rPr kumimoji="1" lang="en-US" altLang="zh-CN" dirty="0"/>
-              <a:t>The </a:t>
+              <a:t> first concept we are going to introduce is </a:t>
             </a:r>
             <a:r>
               <a:rPr kumimoji="1" lang="en-US" altLang="zh-CN" dirty="0" err="1"/>
@@ -3752,7 +3956,7 @@
             </a:r>
             <a:r>
               <a:rPr kumimoji="1" lang="en-US" altLang="zh-CN" dirty="0"/>
-              <a:t> is an architecture of NN proposed in 2012.</a:t>
+              <a:t>, which is an architecture of NN proposed in 2012.</a:t>
             </a:r>
           </a:p>
           <a:p>
@@ -3764,15 +3968,15 @@
           <a:p>
             <a:r>
               <a:rPr kumimoji="1" lang="en-US" altLang="zh-CN" dirty="0"/>
-              <a:t>The </a:t>
+              <a:t>This architecture consists of 8 convolutional layers and 3 of full connected layers with about 61 M </a:t>
             </a:r>
             <a:r>
               <a:rPr kumimoji="1" lang="en-US" altLang="zh-CN" dirty="0" err="1"/>
-              <a:t>Alexnet</a:t>
+              <a:t>parameters,which</a:t>
             </a:r>
             <a:r>
               <a:rPr kumimoji="1" lang="en-US" altLang="zh-CN" dirty="0"/>
-              <a:t> consists of 8 convolutional layers and 3 of full connected layers and has about 61 M parameters,  which is considered as the relatively small number of parameters compared to other NN models</a:t>
+              <a:t> is considered as the relatively small NN compared to others.</a:t>
             </a:r>
           </a:p>
           <a:p>
@@ -41264,7 +41468,7 @@
             <a:avLst/>
           </a:prstGeom>
           <a:blipFill>
-            <a:blip r:embed="rId2" cstate="print"/>
+            <a:blip r:embed="rId3" cstate="print"/>
             <a:stretch>
               <a:fillRect/>
             </a:stretch>
@@ -41642,7 +41846,7 @@
             <a:avLst/>
           </a:prstGeom>
           <a:blipFill>
-            <a:blip r:embed="rId3" cstate="print"/>
+            <a:blip r:embed="rId4" cstate="print"/>
             <a:stretch>
               <a:fillRect/>
             </a:stretch>
@@ -41716,7 +41920,7 @@
             <a:avLst/>
           </a:prstGeom>
           <a:blipFill>
-            <a:blip r:embed="rId2" cstate="print"/>
+            <a:blip r:embed="rId3" cstate="print"/>
             <a:stretch>
               <a:fillRect/>
             </a:stretch>
@@ -42094,7 +42298,7 @@
             <a:avLst/>
           </a:prstGeom>
           <a:blipFill>
-            <a:blip r:embed="rId3" cstate="print"/>
+            <a:blip r:embed="rId4" cstate="print"/>
             <a:stretch>
               <a:fillRect/>
             </a:stretch>
@@ -42168,7 +42372,7 @@
             <a:avLst/>
           </a:prstGeom>
           <a:blipFill>
-            <a:blip r:embed="rId4" cstate="print"/>
+            <a:blip r:embed="rId5" cstate="print"/>
             <a:stretch>
               <a:fillRect/>
             </a:stretch>
@@ -42546,7 +42750,7 @@
             <a:avLst/>
           </a:prstGeom>
           <a:blipFill>
-            <a:blip r:embed="rId3" cstate="print"/>
+            <a:blip r:embed="rId4" cstate="print"/>
             <a:stretch>
               <a:fillRect/>
             </a:stretch>
@@ -42620,7 +42824,7 @@
             <a:avLst/>
           </a:prstGeom>
           <a:blipFill>
-            <a:blip r:embed="rId2" cstate="print"/>
+            <a:blip r:embed="rId3" cstate="print"/>
             <a:stretch>
               <a:fillRect/>
             </a:stretch>
@@ -42998,7 +43202,7 @@
             <a:avLst/>
           </a:prstGeom>
           <a:blipFill>
-            <a:blip r:embed="rId5" cstate="print"/>
+            <a:blip r:embed="rId6" cstate="print"/>
             <a:stretch>
               <a:fillRect/>
             </a:stretch>
@@ -43294,7 +43498,7 @@
                 </a:solidFill>
                 <a:latin typeface="Arial"/>
                 <a:cs typeface="Arial"/>
-                <a:hlinkClick r:id="rId6"/>
+                <a:hlinkClick r:id="rId7"/>
               </a:rPr>
               <a:t>https://www.analyticsvidh</a:t>
             </a:r>
@@ -43305,7 +43509,7 @@
                 </a:solidFill>
                 <a:latin typeface="Arial"/>
                 <a:cs typeface="Arial"/>
-                <a:hlinkClick r:id="rId6"/>
+                <a:hlinkClick r:id="rId7"/>
               </a:rPr>
               <a:t>y</a:t>
             </a:r>
@@ -43316,7 +43520,7 @@
                 </a:solidFill>
                 <a:latin typeface="Arial"/>
                 <a:cs typeface="Arial"/>
-                <a:hlinkClick r:id="rId6"/>
+                <a:hlinkClick r:id="rId7"/>
               </a:rPr>
               <a:t>a.com/blog/2017/09/</a:t>
             </a:r>
@@ -44385,7 +44589,7 @@
                 </a:solidFill>
                 <a:latin typeface="Arial"/>
                 <a:cs typeface="Arial"/>
-                <a:hlinkClick r:id="rId7" action="ppaction://hlinksldjump"/>
+                <a:hlinkClick r:id="rId8" action="ppaction://hlinksldjump"/>
               </a:rPr>
               <a:t>Rethinking </a:t>
             </a:r>
@@ -44396,7 +44600,7 @@
                 </a:solidFill>
                 <a:latin typeface="Arial"/>
                 <a:cs typeface="Arial"/>
-                <a:hlinkClick r:id="rId7" action="ppaction://hlinksldjump"/>
+                <a:hlinkClick r:id="rId8" action="ppaction://hlinksldjump"/>
               </a:rPr>
               <a:t>ImageNet </a:t>
             </a:r>
@@ -44407,7 +44611,7 @@
                 </a:solidFill>
                 <a:latin typeface="Arial"/>
                 <a:cs typeface="Arial"/>
-                <a:hlinkClick r:id="rId7" action="ppaction://hlinksldjump"/>
+                <a:hlinkClick r:id="rId8" action="ppaction://hlinksldjump"/>
               </a:rPr>
               <a:t>Pretraining </a:t>
             </a:r>
@@ -44418,7 +44622,7 @@
                 </a:solidFill>
                 <a:latin typeface="Arial"/>
                 <a:cs typeface="Arial"/>
-                <a:hlinkClick r:id="rId7" action="ppaction://hlinksldjump"/>
+                <a:hlinkClick r:id="rId8" action="ppaction://hlinksldjump"/>
               </a:rPr>
               <a:t>in </a:t>
             </a:r>
@@ -44429,7 +44633,7 @@
                 </a:solidFill>
                 <a:latin typeface="Arial"/>
                 <a:cs typeface="Arial"/>
-                <a:hlinkClick r:id="rId7" action="ppaction://hlinksldjump"/>
+                <a:hlinkClick r:id="rId8" action="ppaction://hlinksldjump"/>
               </a:rPr>
               <a:t>Domain</a:t>
             </a:r>

</xml_diff>